<commit_message>
Added polished files with fixed GUIS
</commit_message>
<xml_diff>
--- a/HexaTrack/GUI3.pptx
+++ b/HexaTrack/GUI3.pptx
@@ -243,7 +243,7 @@
           <a:p>
             <a:fld id="{96326712-ACCD-4F2C-912A-55B82750116F}" type="datetimeFigureOut">
               <a:rPr lang="en-US" smtClean="0"/>
-              <a:t>4/18/2024</a:t>
+              <a:t>4/25/2024</a:t>
             </a:fld>
             <a:endParaRPr lang="en-US"/>
           </a:p>
@@ -413,7 +413,7 @@
           <a:p>
             <a:fld id="{96326712-ACCD-4F2C-912A-55B82750116F}" type="datetimeFigureOut">
               <a:rPr lang="en-US" smtClean="0"/>
-              <a:t>4/18/2024</a:t>
+              <a:t>4/25/2024</a:t>
             </a:fld>
             <a:endParaRPr lang="en-US"/>
           </a:p>
@@ -593,7 +593,7 @@
           <a:p>
             <a:fld id="{96326712-ACCD-4F2C-912A-55B82750116F}" type="datetimeFigureOut">
               <a:rPr lang="en-US" smtClean="0"/>
-              <a:t>4/18/2024</a:t>
+              <a:t>4/25/2024</a:t>
             </a:fld>
             <a:endParaRPr lang="en-US"/>
           </a:p>
@@ -763,7 +763,7 @@
           <a:p>
             <a:fld id="{96326712-ACCD-4F2C-912A-55B82750116F}" type="datetimeFigureOut">
               <a:rPr lang="en-US" smtClean="0"/>
-              <a:t>4/18/2024</a:t>
+              <a:t>4/25/2024</a:t>
             </a:fld>
             <a:endParaRPr lang="en-US"/>
           </a:p>
@@ -1009,7 +1009,7 @@
           <a:p>
             <a:fld id="{96326712-ACCD-4F2C-912A-55B82750116F}" type="datetimeFigureOut">
               <a:rPr lang="en-US" smtClean="0"/>
-              <a:t>4/18/2024</a:t>
+              <a:t>4/25/2024</a:t>
             </a:fld>
             <a:endParaRPr lang="en-US"/>
           </a:p>
@@ -1241,7 +1241,7 @@
           <a:p>
             <a:fld id="{96326712-ACCD-4F2C-912A-55B82750116F}" type="datetimeFigureOut">
               <a:rPr lang="en-US" smtClean="0"/>
-              <a:t>4/18/2024</a:t>
+              <a:t>4/25/2024</a:t>
             </a:fld>
             <a:endParaRPr lang="en-US"/>
           </a:p>
@@ -1608,7 +1608,7 @@
           <a:p>
             <a:fld id="{96326712-ACCD-4F2C-912A-55B82750116F}" type="datetimeFigureOut">
               <a:rPr lang="en-US" smtClean="0"/>
-              <a:t>4/18/2024</a:t>
+              <a:t>4/25/2024</a:t>
             </a:fld>
             <a:endParaRPr lang="en-US"/>
           </a:p>
@@ -1726,7 +1726,7 @@
           <a:p>
             <a:fld id="{96326712-ACCD-4F2C-912A-55B82750116F}" type="datetimeFigureOut">
               <a:rPr lang="en-US" smtClean="0"/>
-              <a:t>4/18/2024</a:t>
+              <a:t>4/25/2024</a:t>
             </a:fld>
             <a:endParaRPr lang="en-US"/>
           </a:p>
@@ -1821,7 +1821,7 @@
           <a:p>
             <a:fld id="{96326712-ACCD-4F2C-912A-55B82750116F}" type="datetimeFigureOut">
               <a:rPr lang="en-US" smtClean="0"/>
-              <a:t>4/18/2024</a:t>
+              <a:t>4/25/2024</a:t>
             </a:fld>
             <a:endParaRPr lang="en-US"/>
           </a:p>
@@ -2098,7 +2098,7 @@
           <a:p>
             <a:fld id="{96326712-ACCD-4F2C-912A-55B82750116F}" type="datetimeFigureOut">
               <a:rPr lang="en-US" smtClean="0"/>
-              <a:t>4/18/2024</a:t>
+              <a:t>4/25/2024</a:t>
             </a:fld>
             <a:endParaRPr lang="en-US"/>
           </a:p>
@@ -2355,7 +2355,7 @@
           <a:p>
             <a:fld id="{96326712-ACCD-4F2C-912A-55B82750116F}" type="datetimeFigureOut">
               <a:rPr lang="en-US" smtClean="0"/>
-              <a:t>4/18/2024</a:t>
+              <a:t>4/25/2024</a:t>
             </a:fld>
             <a:endParaRPr lang="en-US"/>
           </a:p>
@@ -2568,7 +2568,7 @@
           <a:p>
             <a:fld id="{96326712-ACCD-4F2C-912A-55B82750116F}" type="datetimeFigureOut">
               <a:rPr lang="en-US" smtClean="0"/>
-              <a:t>4/18/2024</a:t>
+              <a:t>4/25/2024</a:t>
             </a:fld>
             <a:endParaRPr lang="en-US"/>
           </a:p>
@@ -3513,7 +3513,7 @@
                   </a:gradFill>
                   <a:latin typeface="Aptos Light" panose="020F0502020204030204" pitchFamily="34" charset="0"/>
                 </a:rPr>
-                <a:t>ATTITUDE</a:t>
+                <a:t>POSITION</a:t>
               </a:r>
             </a:p>
           </p:txBody>

</xml_diff>